<commit_message>
Changed chart colors and types
</commit_message>
<xml_diff>
--- a/misc/charts.pptx
+++ b/misc/charts.pptx
@@ -6,7 +6,9 @@
   </p:sldMasterIdLst>
   <p:sldIdLst>
     <p:sldId id="256" r:id="rId2"/>
-    <p:sldId id="257" r:id="rId3"/>
+    <p:sldId id="258" r:id="rId3"/>
+    <p:sldId id="259" r:id="rId4"/>
+    <p:sldId id="257" r:id="rId5"/>
   </p:sldIdLst>
   <p:sldSz cx="9144000" cy="6858000" type="screen4x3"/>
   <p:notesSz cx="6858000" cy="9144000"/>
@@ -262,10 +264,451 @@
   <c:roundedCorners val="0"/>
   <mc:AlternateContent xmlns:mc="http://schemas.openxmlformats.org/markup-compatibility/2006">
     <mc:Choice xmlns:c14="http://schemas.microsoft.com/office/drawing/2007/8/2/chart" Requires="c14">
-      <c14:style val="110"/>
+      <c14:style val="115"/>
     </mc:Choice>
     <mc:Fallback>
-      <c:style val="10"/>
+      <c:style val="15"/>
+    </mc:Fallback>
+  </mc:AlternateContent>
+  <c:chart>
+    <c:title>
+      <c:layout>
+        <c:manualLayout>
+          <c:xMode val="edge"/>
+          <c:yMode val="edge"/>
+          <c:x val="0.14836975065616795"/>
+          <c:y val="1.8749999999999999E-2"/>
+        </c:manualLayout>
+      </c:layout>
+      <c:overlay val="0"/>
+    </c:title>
+    <c:autoTitleDeleted val="0"/>
+    <c:plotArea>
+      <c:layout/>
+      <c:barChart>
+        <c:barDir val="col"/>
+        <c:grouping val="clustered"/>
+        <c:varyColors val="0"/>
+        <c:ser>
+          <c:idx val="0"/>
+          <c:order val="0"/>
+          <c:tx>
+            <c:strRef>
+              <c:f>Sheet1!$B$1</c:f>
+              <c:strCache>
+                <c:ptCount val="1"/>
+                <c:pt idx="0">
+                  <c:v>Companies Worked For</c:v>
+                </c:pt>
+              </c:strCache>
+            </c:strRef>
+          </c:tx>
+          <c:invertIfNegative val="0"/>
+          <c:cat>
+            <c:strRef>
+              <c:f>Sheet1!$A$2:$A$7</c:f>
+              <c:strCache>
+                <c:ptCount val="6"/>
+                <c:pt idx="0">
+                  <c:v>Blackboard</c:v>
+                </c:pt>
+                <c:pt idx="1">
+                  <c:v>Pulte Group</c:v>
+                </c:pt>
+                <c:pt idx="2">
+                  <c:v>Coca-Cola</c:v>
+                </c:pt>
+                <c:pt idx="3">
+                  <c:v>Gwinnett</c:v>
+                </c:pt>
+                <c:pt idx="4">
+                  <c:v>Berry College</c:v>
+                </c:pt>
+                <c:pt idx="5">
+                  <c:v>Barco</c:v>
+                </c:pt>
+              </c:strCache>
+            </c:strRef>
+          </c:cat>
+          <c:val>
+            <c:numRef>
+              <c:f>Sheet1!$B$2:$B$7</c:f>
+              <c:numCache>
+                <c:formatCode>General</c:formatCode>
+                <c:ptCount val="6"/>
+                <c:pt idx="0">
+                  <c:v>10</c:v>
+                </c:pt>
+                <c:pt idx="1">
+                  <c:v>2.6</c:v>
+                </c:pt>
+                <c:pt idx="2">
+                  <c:v>2.7</c:v>
+                </c:pt>
+                <c:pt idx="3">
+                  <c:v>3.3</c:v>
+                </c:pt>
+                <c:pt idx="4">
+                  <c:v>1.3</c:v>
+                </c:pt>
+                <c:pt idx="5">
+                  <c:v>1.5</c:v>
+                </c:pt>
+              </c:numCache>
+            </c:numRef>
+          </c:val>
+        </c:ser>
+        <c:dLbls>
+          <c:showLegendKey val="0"/>
+          <c:showVal val="0"/>
+          <c:showCatName val="0"/>
+          <c:showSerName val="0"/>
+          <c:showPercent val="0"/>
+          <c:showBubbleSize val="0"/>
+        </c:dLbls>
+        <c:gapWidth val="100"/>
+        <c:axId val="97761920"/>
+        <c:axId val="97759616"/>
+      </c:barChart>
+      <c:valAx>
+        <c:axId val="97759616"/>
+        <c:scaling>
+          <c:orientation val="minMax"/>
+        </c:scaling>
+        <c:delete val="0"/>
+        <c:axPos val="l"/>
+        <c:majorGridlines/>
+        <c:numFmt formatCode="General" sourceLinked="1"/>
+        <c:majorTickMark val="out"/>
+        <c:minorTickMark val="none"/>
+        <c:tickLblPos val="nextTo"/>
+        <c:crossAx val="97761920"/>
+        <c:crossBetween val="between"/>
+      </c:valAx>
+      <c:catAx>
+        <c:axId val="97761920"/>
+        <c:scaling>
+          <c:orientation val="minMax"/>
+        </c:scaling>
+        <c:delete val="0"/>
+        <c:axPos val="b"/>
+        <c:majorTickMark val="out"/>
+        <c:minorTickMark val="none"/>
+        <c:tickLblPos val="nextTo"/>
+        <c:crossAx val="97759616"/>
+        <c:auto val="1"/>
+        <c:lblAlgn val="ctr"/>
+        <c:lblOffset val="100"/>
+        <c:noMultiLvlLbl val="0"/>
+      </c:catAx>
+    </c:plotArea>
+    <c:plotVisOnly val="1"/>
+    <c:dispBlanksAs val="gap"/>
+    <c:showDLblsOverMax val="0"/>
+  </c:chart>
+  <c:txPr>
+    <a:bodyPr/>
+    <a:lstStyle/>
+    <a:p>
+      <a:pPr>
+        <a:defRPr sz="1800"/>
+      </a:pPr>
+      <a:endParaRPr lang="en-US"/>
+    </a:p>
+  </c:txPr>
+  <c:externalData r:id="rId1">
+    <c:autoUpdate val="0"/>
+  </c:externalData>
+</c:chartSpace>
+</file>
+
+<file path=ppt/charts/chart3.xml><?xml version="1.0" encoding="utf-8"?>
+<c:chartSpace xmlns:c="http://schemas.openxmlformats.org/drawingml/2006/chart" xmlns:a="http://schemas.openxmlformats.org/drawingml/2006/main" xmlns:r="http://schemas.openxmlformats.org/officeDocument/2006/relationships">
+  <c:date1904 val="0"/>
+  <c:lang val="en-US"/>
+  <c:roundedCorners val="0"/>
+  <mc:AlternateContent xmlns:mc="http://schemas.openxmlformats.org/markup-compatibility/2006">
+    <mc:Choice xmlns:c14="http://schemas.microsoft.com/office/drawing/2007/8/2/chart" Requires="c14">
+      <c14:style val="115"/>
+    </mc:Choice>
+    <mc:Fallback>
+      <c:style val="15"/>
+    </mc:Fallback>
+  </mc:AlternateContent>
+  <c:chart>
+    <c:title>
+      <c:layout>
+        <c:manualLayout>
+          <c:xMode val="edge"/>
+          <c:yMode val="edge"/>
+          <c:x val="0.14836975065616795"/>
+          <c:y val="1.8749999999999999E-2"/>
+        </c:manualLayout>
+      </c:layout>
+      <c:overlay val="0"/>
+      <c:txPr>
+        <a:bodyPr/>
+        <a:lstStyle/>
+        <a:p>
+          <a:pPr>
+            <a:defRPr>
+              <a:solidFill>
+                <a:schemeClr val="tx1">
+                  <a:lumMod val="65000"/>
+                  <a:lumOff val="35000"/>
+                </a:schemeClr>
+              </a:solidFill>
+            </a:defRPr>
+          </a:pPr>
+          <a:endParaRPr lang="en-US"/>
+        </a:p>
+      </c:txPr>
+    </c:title>
+    <c:autoTitleDeleted val="0"/>
+    <c:plotArea>
+      <c:layout/>
+      <c:doughnutChart>
+        <c:varyColors val="1"/>
+        <c:ser>
+          <c:idx val="0"/>
+          <c:order val="0"/>
+          <c:tx>
+            <c:strRef>
+              <c:f>Sheet1!$B$1</c:f>
+              <c:strCache>
+                <c:ptCount val="1"/>
+                <c:pt idx="0">
+                  <c:v>Companies Worked For</c:v>
+                </c:pt>
+              </c:strCache>
+            </c:strRef>
+          </c:tx>
+          <c:cat>
+            <c:strRef>
+              <c:f>Sheet1!$A$2:$A$7</c:f>
+              <c:strCache>
+                <c:ptCount val="6"/>
+                <c:pt idx="0">
+                  <c:v>Blackboard</c:v>
+                </c:pt>
+                <c:pt idx="1">
+                  <c:v>Pulte Group</c:v>
+                </c:pt>
+                <c:pt idx="2">
+                  <c:v>Coca-Cola</c:v>
+                </c:pt>
+                <c:pt idx="3">
+                  <c:v>Gwinnett</c:v>
+                </c:pt>
+                <c:pt idx="4">
+                  <c:v>Berry College</c:v>
+                </c:pt>
+                <c:pt idx="5">
+                  <c:v>Barco</c:v>
+                </c:pt>
+              </c:strCache>
+            </c:strRef>
+          </c:cat>
+          <c:val>
+            <c:numRef>
+              <c:f>Sheet1!$B$2:$B$7</c:f>
+              <c:numCache>
+                <c:formatCode>General</c:formatCode>
+                <c:ptCount val="6"/>
+                <c:pt idx="0">
+                  <c:v>10</c:v>
+                </c:pt>
+                <c:pt idx="1">
+                  <c:v>2.6</c:v>
+                </c:pt>
+                <c:pt idx="2">
+                  <c:v>2.7</c:v>
+                </c:pt>
+                <c:pt idx="3">
+                  <c:v>3.3</c:v>
+                </c:pt>
+                <c:pt idx="4">
+                  <c:v>1.3</c:v>
+                </c:pt>
+                <c:pt idx="5">
+                  <c:v>1.5</c:v>
+                </c:pt>
+              </c:numCache>
+            </c:numRef>
+          </c:val>
+        </c:ser>
+        <c:dLbls>
+          <c:showLegendKey val="0"/>
+          <c:showVal val="0"/>
+          <c:showCatName val="0"/>
+          <c:showSerName val="0"/>
+          <c:showPercent val="0"/>
+          <c:showBubbleSize val="0"/>
+          <c:showLeaderLines val="1"/>
+        </c:dLbls>
+        <c:firstSliceAng val="0"/>
+        <c:holeSize val="50"/>
+      </c:doughnutChart>
+    </c:plotArea>
+    <c:legend>
+      <c:legendPos val="r"/>
+      <c:legendEntry>
+        <c:idx val="0"/>
+        <c:txPr>
+          <a:bodyPr/>
+          <a:lstStyle/>
+          <a:p>
+            <a:pPr>
+              <a:defRPr>
+                <a:solidFill>
+                  <a:schemeClr val="tx1">
+                    <a:lumMod val="65000"/>
+                    <a:lumOff val="35000"/>
+                  </a:schemeClr>
+                </a:solidFill>
+              </a:defRPr>
+            </a:pPr>
+            <a:endParaRPr lang="en-US"/>
+          </a:p>
+        </c:txPr>
+      </c:legendEntry>
+      <c:legendEntry>
+        <c:idx val="1"/>
+        <c:txPr>
+          <a:bodyPr/>
+          <a:lstStyle/>
+          <a:p>
+            <a:pPr>
+              <a:defRPr b="1"/>
+            </a:pPr>
+            <a:endParaRPr lang="en-US"/>
+          </a:p>
+        </c:txPr>
+      </c:legendEntry>
+      <c:legendEntry>
+        <c:idx val="2"/>
+        <c:txPr>
+          <a:bodyPr/>
+          <a:lstStyle/>
+          <a:p>
+            <a:pPr>
+              <a:defRPr>
+                <a:solidFill>
+                  <a:schemeClr val="tx1">
+                    <a:lumMod val="65000"/>
+                    <a:lumOff val="35000"/>
+                  </a:schemeClr>
+                </a:solidFill>
+              </a:defRPr>
+            </a:pPr>
+            <a:endParaRPr lang="en-US"/>
+          </a:p>
+        </c:txPr>
+      </c:legendEntry>
+      <c:legendEntry>
+        <c:idx val="3"/>
+        <c:txPr>
+          <a:bodyPr/>
+          <a:lstStyle/>
+          <a:p>
+            <a:pPr>
+              <a:defRPr>
+                <a:solidFill>
+                  <a:schemeClr val="tx1">
+                    <a:lumMod val="65000"/>
+                    <a:lumOff val="35000"/>
+                  </a:schemeClr>
+                </a:solidFill>
+              </a:defRPr>
+            </a:pPr>
+            <a:endParaRPr lang="en-US"/>
+          </a:p>
+        </c:txPr>
+      </c:legendEntry>
+      <c:legendEntry>
+        <c:idx val="4"/>
+        <c:txPr>
+          <a:bodyPr/>
+          <a:lstStyle/>
+          <a:p>
+            <a:pPr>
+              <a:defRPr>
+                <a:solidFill>
+                  <a:schemeClr val="tx1">
+                    <a:lumMod val="65000"/>
+                    <a:lumOff val="35000"/>
+                  </a:schemeClr>
+                </a:solidFill>
+              </a:defRPr>
+            </a:pPr>
+            <a:endParaRPr lang="en-US"/>
+          </a:p>
+        </c:txPr>
+      </c:legendEntry>
+      <c:legendEntry>
+        <c:idx val="5"/>
+        <c:txPr>
+          <a:bodyPr/>
+          <a:lstStyle/>
+          <a:p>
+            <a:pPr>
+              <a:defRPr>
+                <a:solidFill>
+                  <a:schemeClr val="tx1">
+                    <a:lumMod val="65000"/>
+                    <a:lumOff val="35000"/>
+                  </a:schemeClr>
+                </a:solidFill>
+              </a:defRPr>
+            </a:pPr>
+            <a:endParaRPr lang="en-US"/>
+          </a:p>
+        </c:txPr>
+      </c:legendEntry>
+      <c:layout>
+        <c:manualLayout>
+          <c:xMode val="edge"/>
+          <c:yMode val="edge"/>
+          <c:x val="0.70203592519685043"/>
+          <c:y val="0.28255290354330709"/>
+          <c:w val="0.25629740813648294"/>
+          <c:h val="0.52040994094488191"/>
+        </c:manualLayout>
+      </c:layout>
+      <c:overlay val="0"/>
+    </c:legend>
+    <c:plotVisOnly val="1"/>
+    <c:dispBlanksAs val="gap"/>
+    <c:showDLblsOverMax val="0"/>
+  </c:chart>
+  <c:txPr>
+    <a:bodyPr/>
+    <a:lstStyle/>
+    <a:p>
+      <a:pPr>
+        <a:defRPr sz="1800"/>
+      </a:pPr>
+      <a:endParaRPr lang="en-US"/>
+    </a:p>
+  </c:txPr>
+  <c:externalData r:id="rId1">
+    <c:autoUpdate val="0"/>
+  </c:externalData>
+  <c:userShapes r:id="rId2"/>
+</c:chartSpace>
+</file>
+
+<file path=ppt/charts/chart4.xml><?xml version="1.0" encoding="utf-8"?>
+<c:chartSpace xmlns:c="http://schemas.openxmlformats.org/drawingml/2006/chart" xmlns:a="http://schemas.openxmlformats.org/drawingml/2006/main" xmlns:r="http://schemas.openxmlformats.org/officeDocument/2006/relationships">
+  <c:date1904 val="0"/>
+  <c:lang val="en-US"/>
+  <c:roundedCorners val="0"/>
+  <mc:AlternateContent xmlns:mc="http://schemas.openxmlformats.org/markup-compatibility/2006">
+    <mc:Choice xmlns:c14="http://schemas.microsoft.com/office/drawing/2007/8/2/chart" Requires="c14">
+      <c14:style val="115"/>
+    </mc:Choice>
+    <mc:Fallback>
+      <c:style val="15"/>
     </mc:Fallback>
   </mc:AlternateContent>
   <c:chart>
@@ -276,13 +719,26 @@
           <a:lstStyle/>
           <a:p>
             <a:pPr>
-              <a:defRPr/>
+              <a:defRPr>
+                <a:solidFill>
+                  <a:schemeClr val="tx1">
+                    <a:lumMod val="65000"/>
+                    <a:lumOff val="35000"/>
+                  </a:schemeClr>
+                </a:solidFill>
+              </a:defRPr>
             </a:pPr>
             <a:r>
-              <a:rPr lang="en-US" dirty="0" smtClean="0"/>
+              <a:rPr lang="en-US">
+                <a:solidFill>
+                  <a:schemeClr val="tx1">
+                    <a:lumMod val="65000"/>
+                    <a:lumOff val="35000"/>
+                  </a:schemeClr>
+                </a:solidFill>
+              </a:rPr>
               <a:t>Positions Held</a:t>
             </a:r>
-            <a:endParaRPr lang="en-US" dirty="0"/>
           </a:p>
         </c:rich>
       </c:tx>
@@ -299,7 +755,7 @@
     <c:autoTitleDeleted val="0"/>
     <c:plotArea>
       <c:layout/>
-      <c:pieChart>
+      <c:doughnutChart>
         <c:varyColors val="1"/>
         <c:ser>
           <c:idx val="0"/>
@@ -315,9 +771,6 @@
               </c:strCache>
             </c:strRef>
           </c:tx>
-          <c:spPr>
-            <a:effectLst/>
-          </c:spPr>
           <c:cat>
             <c:strRef>
               <c:f>Sheet1!$A$2:$A$5</c:f>
@@ -370,10 +823,84 @@
           <c:showLeaderLines val="1"/>
         </c:dLbls>
         <c:firstSliceAng val="0"/>
-      </c:pieChart>
+        <c:holeSize val="50"/>
+      </c:doughnutChart>
     </c:plotArea>
     <c:legend>
       <c:legendPos val="r"/>
+      <c:legendEntry>
+        <c:idx val="0"/>
+        <c:txPr>
+          <a:bodyPr/>
+          <a:lstStyle/>
+          <a:p>
+            <a:pPr>
+              <a:defRPr b="1"/>
+            </a:pPr>
+            <a:endParaRPr lang="en-US"/>
+          </a:p>
+        </c:txPr>
+      </c:legendEntry>
+      <c:legendEntry>
+        <c:idx val="1"/>
+        <c:txPr>
+          <a:bodyPr/>
+          <a:lstStyle/>
+          <a:p>
+            <a:pPr>
+              <a:defRPr>
+                <a:solidFill>
+                  <a:schemeClr val="tx1">
+                    <a:lumMod val="65000"/>
+                    <a:lumOff val="35000"/>
+                  </a:schemeClr>
+                </a:solidFill>
+              </a:defRPr>
+            </a:pPr>
+            <a:endParaRPr lang="en-US"/>
+          </a:p>
+        </c:txPr>
+      </c:legendEntry>
+      <c:legendEntry>
+        <c:idx val="2"/>
+        <c:txPr>
+          <a:bodyPr/>
+          <a:lstStyle/>
+          <a:p>
+            <a:pPr>
+              <a:defRPr>
+                <a:solidFill>
+                  <a:schemeClr val="tx1">
+                    <a:lumMod val="65000"/>
+                    <a:lumOff val="35000"/>
+                  </a:schemeClr>
+                </a:solidFill>
+              </a:defRPr>
+            </a:pPr>
+            <a:endParaRPr lang="en-US"/>
+          </a:p>
+        </c:txPr>
+      </c:legendEntry>
+      <c:legendEntry>
+        <c:idx val="3"/>
+        <c:txPr>
+          <a:bodyPr/>
+          <a:lstStyle/>
+          <a:p>
+            <a:pPr>
+              <a:defRPr>
+                <a:solidFill>
+                  <a:schemeClr val="tx1">
+                    <a:lumMod val="65000"/>
+                    <a:lumOff val="35000"/>
+                  </a:schemeClr>
+                </a:solidFill>
+              </a:defRPr>
+            </a:pPr>
+            <a:endParaRPr lang="en-US"/>
+          </a:p>
+        </c:txPr>
+      </c:legendEntry>
       <c:layout>
         <c:manualLayout>
           <c:xMode val="edge"/>
@@ -404,6 +931,164 @@
     <c:autoUpdate val="0"/>
   </c:externalData>
 </c:chartSpace>
+</file>
+
+<file path=ppt/drawings/drawing1.xml><?xml version="1.0" encoding="utf-8"?>
+<c:userShapes xmlns:c="http://schemas.openxmlformats.org/drawingml/2006/chart">
+  <cdr:relSizeAnchor xmlns:cdr="http://schemas.openxmlformats.org/drawingml/2006/chartDrawing">
+    <cdr:from>
+      <cdr:x>0.3125</cdr:x>
+      <cdr:y>0.825</cdr:y>
+    </cdr:from>
+    <cdr:to>
+      <cdr:x>0.35</cdr:x>
+      <cdr:y>0.88125</cdr:y>
+    </cdr:to>
+    <cdr:sp macro="" textlink="">
+      <cdr:nvSpPr>
+        <cdr:cNvPr id="4" name="5-Point Star 3"/>
+        <cdr:cNvSpPr/>
+      </cdr:nvSpPr>
+      <cdr:spPr>
+        <a:xfrm xmlns:a="http://schemas.openxmlformats.org/drawingml/2006/main">
+          <a:off x="1905000" y="3352800"/>
+          <a:ext cx="228600" cy="228600"/>
+        </a:xfrm>
+        <a:prstGeom xmlns:a="http://schemas.openxmlformats.org/drawingml/2006/main" prst="star5">
+          <a:avLst/>
+        </a:prstGeom>
+        <a:solidFill xmlns:a="http://schemas.openxmlformats.org/drawingml/2006/main">
+          <a:schemeClr val="tx1">
+            <a:lumMod val="75000"/>
+            <a:lumOff val="25000"/>
+          </a:schemeClr>
+        </a:solidFill>
+        <a:ln xmlns:a="http://schemas.openxmlformats.org/drawingml/2006/main">
+          <a:solidFill>
+            <a:schemeClr val="tx1">
+              <a:lumMod val="75000"/>
+              <a:lumOff val="25000"/>
+            </a:schemeClr>
+          </a:solidFill>
+        </a:ln>
+      </cdr:spPr>
+      <cdr:style>
+        <a:lnRef xmlns:a="http://schemas.openxmlformats.org/drawingml/2006/main" idx="2">
+          <a:schemeClr val="dk1">
+            <a:shade val="50000"/>
+          </a:schemeClr>
+        </a:lnRef>
+        <a:fillRef xmlns:a="http://schemas.openxmlformats.org/drawingml/2006/main" idx="1">
+          <a:schemeClr val="dk1"/>
+        </a:fillRef>
+        <a:effectRef xmlns:a="http://schemas.openxmlformats.org/drawingml/2006/main" idx="0">
+          <a:schemeClr val="dk1"/>
+        </a:effectRef>
+        <a:fontRef xmlns:a="http://schemas.openxmlformats.org/drawingml/2006/main" idx="minor">
+          <a:schemeClr val="lt1"/>
+        </a:fontRef>
+      </cdr:style>
+      <cdr:txBody>
+        <a:bodyPr xmlns:a="http://schemas.openxmlformats.org/drawingml/2006/main"/>
+        <a:lstStyle xmlns:a="http://schemas.openxmlformats.org/drawingml/2006/main">
+          <a:lvl1pPr marL="0" indent="0">
+            <a:defRPr sz="1100">
+              <a:solidFill>
+                <a:schemeClr val="lt1"/>
+              </a:solidFill>
+              <a:latin typeface="+mn-lt"/>
+              <a:ea typeface="+mn-ea"/>
+              <a:cs typeface="+mn-cs"/>
+            </a:defRPr>
+          </a:lvl1pPr>
+          <a:lvl2pPr marL="457200" indent="0">
+            <a:defRPr sz="1100">
+              <a:solidFill>
+                <a:schemeClr val="lt1"/>
+              </a:solidFill>
+              <a:latin typeface="+mn-lt"/>
+              <a:ea typeface="+mn-ea"/>
+              <a:cs typeface="+mn-cs"/>
+            </a:defRPr>
+          </a:lvl2pPr>
+          <a:lvl3pPr marL="914400" indent="0">
+            <a:defRPr sz="1100">
+              <a:solidFill>
+                <a:schemeClr val="lt1"/>
+              </a:solidFill>
+              <a:latin typeface="+mn-lt"/>
+              <a:ea typeface="+mn-ea"/>
+              <a:cs typeface="+mn-cs"/>
+            </a:defRPr>
+          </a:lvl3pPr>
+          <a:lvl4pPr marL="1371600" indent="0">
+            <a:defRPr sz="1100">
+              <a:solidFill>
+                <a:schemeClr val="lt1"/>
+              </a:solidFill>
+              <a:latin typeface="+mn-lt"/>
+              <a:ea typeface="+mn-ea"/>
+              <a:cs typeface="+mn-cs"/>
+            </a:defRPr>
+          </a:lvl4pPr>
+          <a:lvl5pPr marL="1828800" indent="0">
+            <a:defRPr sz="1100">
+              <a:solidFill>
+                <a:schemeClr val="lt1"/>
+              </a:solidFill>
+              <a:latin typeface="+mn-lt"/>
+              <a:ea typeface="+mn-ea"/>
+              <a:cs typeface="+mn-cs"/>
+            </a:defRPr>
+          </a:lvl5pPr>
+          <a:lvl6pPr marL="2286000" indent="0">
+            <a:defRPr sz="1100">
+              <a:solidFill>
+                <a:schemeClr val="lt1"/>
+              </a:solidFill>
+              <a:latin typeface="+mn-lt"/>
+              <a:ea typeface="+mn-ea"/>
+              <a:cs typeface="+mn-cs"/>
+            </a:defRPr>
+          </a:lvl6pPr>
+          <a:lvl7pPr marL="2743200" indent="0">
+            <a:defRPr sz="1100">
+              <a:solidFill>
+                <a:schemeClr val="lt1"/>
+              </a:solidFill>
+              <a:latin typeface="+mn-lt"/>
+              <a:ea typeface="+mn-ea"/>
+              <a:cs typeface="+mn-cs"/>
+            </a:defRPr>
+          </a:lvl7pPr>
+          <a:lvl8pPr marL="3200400" indent="0">
+            <a:defRPr sz="1100">
+              <a:solidFill>
+                <a:schemeClr val="lt1"/>
+              </a:solidFill>
+              <a:latin typeface="+mn-lt"/>
+              <a:ea typeface="+mn-ea"/>
+              <a:cs typeface="+mn-cs"/>
+            </a:defRPr>
+          </a:lvl8pPr>
+          <a:lvl9pPr marL="3657600" indent="0">
+            <a:defRPr sz="1100">
+              <a:solidFill>
+                <a:schemeClr val="lt1"/>
+              </a:solidFill>
+              <a:latin typeface="+mn-lt"/>
+              <a:ea typeface="+mn-ea"/>
+              <a:cs typeface="+mn-cs"/>
+            </a:defRPr>
+          </a:lvl9pPr>
+        </a:lstStyle>
+        <a:p xmlns:a="http://schemas.openxmlformats.org/drawingml/2006/main">
+          <a:endParaRPr lang="en-US"/>
+        </a:p>
+      </cdr:txBody>
+    </cdr:sp>
+  </cdr:relSizeAnchor>
+</c:userShapes>
 </file>
 
 <file path=ppt/slideLayouts/slideLayout1.xml><?xml version="1.0" encoding="utf-8"?>
@@ -3460,7 +4145,7 @@
           <p:nvPr>
             <p:extLst>
               <p:ext uri="{D42A27DB-BD31-4B8C-83A1-F6EECF244321}">
-                <p14:modId xmlns:p14="http://schemas.microsoft.com/office/powerpoint/2010/main" val="4000847948"/>
+                <p14:modId xmlns:p14="http://schemas.microsoft.com/office/powerpoint/2010/main" val="1017926939"/>
               </p:ext>
             </p:extLst>
           </p:nvPr>
@@ -3475,6 +4160,268 @@
           </a:graphicData>
         </a:graphic>
       </p:graphicFrame>
+    </p:spTree>
+    <p:extLst>
+      <p:ext uri="{BB962C8B-B14F-4D97-AF65-F5344CB8AC3E}">
+        <p14:creationId xmlns:p14="http://schemas.microsoft.com/office/powerpoint/2010/main" val="418653006"/>
+      </p:ext>
+    </p:extLst>
+  </p:cSld>
+  <p:clrMapOvr>
+    <a:masterClrMapping/>
+  </p:clrMapOvr>
+  <p:timing>
+    <p:tnLst>
+      <p:par>
+        <p:cTn id="1" dur="indefinite" restart="never" nodeType="tmRoot"/>
+      </p:par>
+    </p:tnLst>
+  </p:timing>
+</p:sld>
+</file>
+
+<file path=ppt/slides/slide3.xml><?xml version="1.0" encoding="utf-8"?>
+<p:sld xmlns:a="http://schemas.openxmlformats.org/drawingml/2006/main" xmlns:r="http://schemas.openxmlformats.org/officeDocument/2006/relationships" xmlns:p="http://schemas.openxmlformats.org/presentationml/2006/main">
+  <p:cSld>
+    <p:spTree>
+      <p:nvGrpSpPr>
+        <p:cNvPr id="1" name=""/>
+        <p:cNvGrpSpPr/>
+        <p:nvPr/>
+      </p:nvGrpSpPr>
+      <p:grpSpPr>
+        <a:xfrm>
+          <a:off x="0" y="0"/>
+          <a:ext cx="0" cy="0"/>
+          <a:chOff x="0" y="0"/>
+          <a:chExt cx="0" cy="0"/>
+        </a:xfrm>
+      </p:grpSpPr>
+      <p:graphicFrame>
+        <p:nvGraphicFramePr>
+          <p:cNvPr id="4" name="Chart 3"/>
+          <p:cNvGraphicFramePr/>
+          <p:nvPr>
+            <p:extLst>
+              <p:ext uri="{D42A27DB-BD31-4B8C-83A1-F6EECF244321}">
+                <p14:modId xmlns:p14="http://schemas.microsoft.com/office/powerpoint/2010/main" val="2628117277"/>
+              </p:ext>
+            </p:extLst>
+          </p:nvPr>
+        </p:nvGraphicFramePr>
+        <p:xfrm>
+          <a:off x="1524000" y="1371600"/>
+          <a:ext cx="6096000" cy="4064000"/>
+        </p:xfrm>
+        <a:graphic>
+          <a:graphicData uri="http://schemas.openxmlformats.org/drawingml/2006/chart">
+            <c:chart xmlns:c="http://schemas.openxmlformats.org/drawingml/2006/chart" xmlns:r="http://schemas.openxmlformats.org/officeDocument/2006/relationships" r:id="rId2"/>
+          </a:graphicData>
+        </a:graphic>
+      </p:graphicFrame>
+    </p:spTree>
+    <p:extLst>
+      <p:ext uri="{BB962C8B-B14F-4D97-AF65-F5344CB8AC3E}">
+        <p14:creationId xmlns:p14="http://schemas.microsoft.com/office/powerpoint/2010/main" val="4092803185"/>
+      </p:ext>
+    </p:extLst>
+  </p:cSld>
+  <p:clrMapOvr>
+    <a:masterClrMapping/>
+  </p:clrMapOvr>
+  <p:timing>
+    <p:tnLst>
+      <p:par>
+        <p:cTn id="1" dur="indefinite" restart="never" nodeType="tmRoot"/>
+      </p:par>
+    </p:tnLst>
+  </p:timing>
+</p:sld>
+</file>
+
+<file path=ppt/slides/slide4.xml><?xml version="1.0" encoding="utf-8"?>
+<p:sld xmlns:a="http://schemas.openxmlformats.org/drawingml/2006/main" xmlns:r="http://schemas.openxmlformats.org/officeDocument/2006/relationships" xmlns:p="http://schemas.openxmlformats.org/presentationml/2006/main">
+  <p:cSld>
+    <p:spTree>
+      <p:nvGrpSpPr>
+        <p:cNvPr id="1" name=""/>
+        <p:cNvGrpSpPr/>
+        <p:nvPr/>
+      </p:nvGrpSpPr>
+      <p:grpSpPr>
+        <a:xfrm>
+          <a:off x="0" y="0"/>
+          <a:ext cx="0" cy="0"/>
+          <a:chOff x="0" y="0"/>
+          <a:chExt cx="0" cy="0"/>
+        </a:xfrm>
+      </p:grpSpPr>
+      <p:graphicFrame>
+        <p:nvGraphicFramePr>
+          <p:cNvPr id="4" name="Chart 3"/>
+          <p:cNvGraphicFramePr/>
+          <p:nvPr>
+            <p:extLst>
+              <p:ext uri="{D42A27DB-BD31-4B8C-83A1-F6EECF244321}">
+                <p14:modId xmlns:p14="http://schemas.microsoft.com/office/powerpoint/2010/main" val="341606742"/>
+              </p:ext>
+            </p:extLst>
+          </p:nvPr>
+        </p:nvGraphicFramePr>
+        <p:xfrm>
+          <a:off x="1524000" y="1371600"/>
+          <a:ext cx="6096000" cy="4064000"/>
+        </p:xfrm>
+        <a:graphic>
+          <a:graphicData uri="http://schemas.openxmlformats.org/drawingml/2006/chart">
+            <c:chart xmlns:c="http://schemas.openxmlformats.org/drawingml/2006/chart" xmlns:r="http://schemas.openxmlformats.org/officeDocument/2006/relationships" r:id="rId2"/>
+          </a:graphicData>
+        </a:graphic>
+      </p:graphicFrame>
+      <p:sp>
+        <p:nvSpPr>
+          <p:cNvPr id="5" name="5-Point Star 4"/>
+          <p:cNvSpPr/>
+          <p:nvPr/>
+        </p:nvSpPr>
+        <p:spPr>
+          <a:xfrm>
+            <a:off x="4686300" y="3657600"/>
+            <a:ext cx="228600" cy="228600"/>
+          </a:xfrm>
+          <a:prstGeom prst="star5">
+            <a:avLst/>
+          </a:prstGeom>
+          <a:solidFill>
+            <a:schemeClr val="tx1">
+              <a:lumMod val="75000"/>
+              <a:lumOff val="25000"/>
+            </a:schemeClr>
+          </a:solidFill>
+          <a:ln>
+            <a:solidFill>
+              <a:schemeClr val="tx1">
+                <a:lumMod val="75000"/>
+                <a:lumOff val="25000"/>
+              </a:schemeClr>
+            </a:solidFill>
+          </a:ln>
+        </p:spPr>
+        <p:style>
+          <a:lnRef idx="2">
+            <a:schemeClr val="dk1">
+              <a:shade val="50000"/>
+            </a:schemeClr>
+          </a:lnRef>
+          <a:fillRef idx="1">
+            <a:schemeClr val="dk1"/>
+          </a:fillRef>
+          <a:effectRef idx="0">
+            <a:schemeClr val="dk1"/>
+          </a:effectRef>
+          <a:fontRef idx="minor">
+            <a:schemeClr val="lt1"/>
+          </a:fontRef>
+        </p:style>
+        <p:txBody>
+          <a:bodyPr/>
+          <a:lstStyle>
+            <a:lvl1pPr marL="0" indent="0">
+              <a:defRPr sz="1100">
+                <a:solidFill>
+                  <a:schemeClr val="lt1"/>
+                </a:solidFill>
+                <a:latin typeface="+mn-lt"/>
+                <a:ea typeface="+mn-ea"/>
+                <a:cs typeface="+mn-cs"/>
+              </a:defRPr>
+            </a:lvl1pPr>
+            <a:lvl2pPr marL="457200" indent="0">
+              <a:defRPr sz="1100">
+                <a:solidFill>
+                  <a:schemeClr val="lt1"/>
+                </a:solidFill>
+                <a:latin typeface="+mn-lt"/>
+                <a:ea typeface="+mn-ea"/>
+                <a:cs typeface="+mn-cs"/>
+              </a:defRPr>
+            </a:lvl2pPr>
+            <a:lvl3pPr marL="914400" indent="0">
+              <a:defRPr sz="1100">
+                <a:solidFill>
+                  <a:schemeClr val="lt1"/>
+                </a:solidFill>
+                <a:latin typeface="+mn-lt"/>
+                <a:ea typeface="+mn-ea"/>
+                <a:cs typeface="+mn-cs"/>
+              </a:defRPr>
+            </a:lvl3pPr>
+            <a:lvl4pPr marL="1371600" indent="0">
+              <a:defRPr sz="1100">
+                <a:solidFill>
+                  <a:schemeClr val="lt1"/>
+                </a:solidFill>
+                <a:latin typeface="+mn-lt"/>
+                <a:ea typeface="+mn-ea"/>
+                <a:cs typeface="+mn-cs"/>
+              </a:defRPr>
+            </a:lvl4pPr>
+            <a:lvl5pPr marL="1828800" indent="0">
+              <a:defRPr sz="1100">
+                <a:solidFill>
+                  <a:schemeClr val="lt1"/>
+                </a:solidFill>
+                <a:latin typeface="+mn-lt"/>
+                <a:ea typeface="+mn-ea"/>
+                <a:cs typeface="+mn-cs"/>
+              </a:defRPr>
+            </a:lvl5pPr>
+            <a:lvl6pPr marL="2286000" indent="0">
+              <a:defRPr sz="1100">
+                <a:solidFill>
+                  <a:schemeClr val="lt1"/>
+                </a:solidFill>
+                <a:latin typeface="+mn-lt"/>
+                <a:ea typeface="+mn-ea"/>
+                <a:cs typeface="+mn-cs"/>
+              </a:defRPr>
+            </a:lvl6pPr>
+            <a:lvl7pPr marL="2743200" indent="0">
+              <a:defRPr sz="1100">
+                <a:solidFill>
+                  <a:schemeClr val="lt1"/>
+                </a:solidFill>
+                <a:latin typeface="+mn-lt"/>
+                <a:ea typeface="+mn-ea"/>
+                <a:cs typeface="+mn-cs"/>
+              </a:defRPr>
+            </a:lvl7pPr>
+            <a:lvl8pPr marL="3200400" indent="0">
+              <a:defRPr sz="1100">
+                <a:solidFill>
+                  <a:schemeClr val="lt1"/>
+                </a:solidFill>
+                <a:latin typeface="+mn-lt"/>
+                <a:ea typeface="+mn-ea"/>
+                <a:cs typeface="+mn-cs"/>
+              </a:defRPr>
+            </a:lvl8pPr>
+            <a:lvl9pPr marL="3657600" indent="0">
+              <a:defRPr sz="1100">
+                <a:solidFill>
+                  <a:schemeClr val="lt1"/>
+                </a:solidFill>
+                <a:latin typeface="+mn-lt"/>
+                <a:ea typeface="+mn-ea"/>
+                <a:cs typeface="+mn-cs"/>
+              </a:defRPr>
+            </a:lvl9pPr>
+          </a:lstStyle>
+          <a:p>
+            <a:endParaRPr lang="en-US"/>
+          </a:p>
+        </p:txBody>
+      </p:sp>
     </p:spTree>
     <p:extLst>
       <p:ext uri="{BB962C8B-B14F-4D97-AF65-F5344CB8AC3E}">

</xml_diff>

<commit_message>
Removed shadow from charts
</commit_message>
<xml_diff>
--- a/misc/charts.pptx
+++ b/misc/charts.pptx
@@ -367,11 +367,11 @@
           <c:showBubbleSize val="0"/>
         </c:dLbls>
         <c:gapWidth val="100"/>
-        <c:axId val="97761920"/>
-        <c:axId val="97759616"/>
+        <c:axId val="114240896"/>
+        <c:axId val="114239360"/>
       </c:barChart>
       <c:valAx>
-        <c:axId val="97759616"/>
+        <c:axId val="114239360"/>
         <c:scaling>
           <c:orientation val="minMax"/>
         </c:scaling>
@@ -382,11 +382,12 @@
         <c:majorTickMark val="out"/>
         <c:minorTickMark val="none"/>
         <c:tickLblPos val="nextTo"/>
-        <c:crossAx val="97761920"/>
+        <c:crossAx val="114240896"/>
+        <c:crosses val="autoZero"/>
         <c:crossBetween val="between"/>
       </c:valAx>
       <c:catAx>
-        <c:axId val="97761920"/>
+        <c:axId val="114240896"/>
         <c:scaling>
           <c:orientation val="minMax"/>
         </c:scaling>
@@ -395,7 +396,8 @@
         <c:majorTickMark val="out"/>
         <c:minorTickMark val="none"/>
         <c:tickLblPos val="nextTo"/>
-        <c:crossAx val="97759616"/>
+        <c:crossAx val="114239360"/>
+        <c:crosses val="autoZero"/>
         <c:auto val="1"/>
         <c:lblAlgn val="ctr"/>
         <c:lblOffset val="100"/>
@@ -483,6 +485,9 @@
               </c:strCache>
             </c:strRef>
           </c:tx>
+          <c:spPr>
+            <a:effectLst/>
+          </c:spPr>
           <c:cat>
             <c:strRef>
               <c:f>Sheet1!$A$2:$A$7</c:f>
@@ -771,6 +776,9 @@
               </c:strCache>
             </c:strRef>
           </c:tx>
+          <c:spPr>
+            <a:effectLst/>
+          </c:spPr>
           <c:cat>
             <c:strRef>
               <c:f>Sheet1!$A$2:$A$5</c:f>
@@ -4204,7 +4212,7 @@
           <p:nvPr>
             <p:extLst>
               <p:ext uri="{D42A27DB-BD31-4B8C-83A1-F6EECF244321}">
-                <p14:modId xmlns:p14="http://schemas.microsoft.com/office/powerpoint/2010/main" val="2628117277"/>
+                <p14:modId xmlns:p14="http://schemas.microsoft.com/office/powerpoint/2010/main" val="2895773915"/>
               </p:ext>
             </p:extLst>
           </p:nvPr>
@@ -4263,7 +4271,7 @@
           <p:nvPr>
             <p:extLst>
               <p:ext uri="{D42A27DB-BD31-4B8C-83A1-F6EECF244321}">
-                <p14:modId xmlns:p14="http://schemas.microsoft.com/office/powerpoint/2010/main" val="341606742"/>
+                <p14:modId xmlns:p14="http://schemas.microsoft.com/office/powerpoint/2010/main" val="1173629493"/>
               </p:ext>
             </p:extLst>
           </p:nvPr>

</xml_diff>

<commit_message>
Updated chart with current company name first
</commit_message>
<xml_diff>
--- a/misc/charts.pptx
+++ b/misc/charts.pptx
@@ -367,11 +367,11 @@
           <c:showBubbleSize val="0"/>
         </c:dLbls>
         <c:gapWidth val="100"/>
-        <c:axId val="114240896"/>
-        <c:axId val="114239360"/>
+        <c:axId val="101526912"/>
+        <c:axId val="101525376"/>
       </c:barChart>
       <c:valAx>
-        <c:axId val="114239360"/>
+        <c:axId val="101525376"/>
         <c:scaling>
           <c:orientation val="minMax"/>
         </c:scaling>
@@ -382,12 +382,12 @@
         <c:majorTickMark val="out"/>
         <c:minorTickMark val="none"/>
         <c:tickLblPos val="nextTo"/>
-        <c:crossAx val="114240896"/>
+        <c:crossAx val="101526912"/>
         <c:crosses val="autoZero"/>
         <c:crossBetween val="between"/>
       </c:valAx>
       <c:catAx>
-        <c:axId val="114240896"/>
+        <c:axId val="101526912"/>
         <c:scaling>
           <c:orientation val="minMax"/>
         </c:scaling>
@@ -396,7 +396,7 @@
         <c:majorTickMark val="out"/>
         <c:minorTickMark val="none"/>
         <c:tickLblPos val="nextTo"/>
-        <c:crossAx val="114239360"/>
+        <c:crossAx val="101525376"/>
         <c:crosses val="autoZero"/>
         <c:auto val="1"/>
         <c:lblAlgn val="ctr"/>
@@ -494,10 +494,10 @@
               <c:strCache>
                 <c:ptCount val="6"/>
                 <c:pt idx="0">
-                  <c:v>Blackboard</c:v>
+                  <c:v>Pulte Group</c:v>
                 </c:pt>
                 <c:pt idx="1">
-                  <c:v>Pulte Group</c:v>
+                  <c:v>Blackboard</c:v>
                 </c:pt>
                 <c:pt idx="2">
                   <c:v>Coca-Cola</c:v>
@@ -521,10 +521,10 @@
                 <c:formatCode>General</c:formatCode>
                 <c:ptCount val="6"/>
                 <c:pt idx="0">
-                  <c:v>10</c:v>
+                  <c:v>2.6</c:v>
                 </c:pt>
                 <c:pt idx="1">
-                  <c:v>2.6</c:v>
+                  <c:v>10</c:v>
                 </c:pt>
                 <c:pt idx="2">
                   <c:v>2.7</c:v>
@@ -564,7 +564,24 @@
           <a:lstStyle/>
           <a:p>
             <a:pPr>
-              <a:defRPr>
+              <a:defRPr b="1">
+                <a:solidFill>
+                  <a:schemeClr val="tx1"/>
+                </a:solidFill>
+              </a:defRPr>
+            </a:pPr>
+            <a:endParaRPr lang="en-US"/>
+          </a:p>
+        </c:txPr>
+      </c:legendEntry>
+      <c:legendEntry>
+        <c:idx val="1"/>
+        <c:txPr>
+          <a:bodyPr/>
+          <a:lstStyle/>
+          <a:p>
+            <a:pPr>
+              <a:defRPr b="0">
                 <a:solidFill>
                   <a:schemeClr val="tx1">
                     <a:lumMod val="65000"/>
@@ -572,19 +589,6 @@
                   </a:schemeClr>
                 </a:solidFill>
               </a:defRPr>
-            </a:pPr>
-            <a:endParaRPr lang="en-US"/>
-          </a:p>
-        </c:txPr>
-      </c:legendEntry>
-      <c:legendEntry>
-        <c:idx val="1"/>
-        <c:txPr>
-          <a:bodyPr/>
-          <a:lstStyle/>
-          <a:p>
-            <a:pPr>
-              <a:defRPr b="1"/>
             </a:pPr>
             <a:endParaRPr lang="en-US"/>
           </a:p>
@@ -945,12 +949,12 @@
 <c:userShapes xmlns:c="http://schemas.openxmlformats.org/drawingml/2006/chart">
   <cdr:relSizeAnchor xmlns:cdr="http://schemas.openxmlformats.org/drawingml/2006/chartDrawing">
     <cdr:from>
-      <cdr:x>0.3125</cdr:x>
-      <cdr:y>0.825</cdr:y>
+      <cdr:x>0.425</cdr:x>
+      <cdr:y>0.24375</cdr:y>
     </cdr:from>
     <cdr:to>
-      <cdr:x>0.35</cdr:x>
-      <cdr:y>0.88125</cdr:y>
+      <cdr:x>0.4625</cdr:x>
+      <cdr:y>0.3</cdr:y>
     </cdr:to>
     <cdr:sp macro="" textlink="">
       <cdr:nvSpPr>
@@ -959,7 +963,7 @@
       </cdr:nvSpPr>
       <cdr:spPr>
         <a:xfrm xmlns:a="http://schemas.openxmlformats.org/drawingml/2006/main">
-          <a:off x="1905000" y="3352800"/>
+          <a:off x="2590800" y="990600"/>
           <a:ext cx="228600" cy="228600"/>
         </a:xfrm>
         <a:prstGeom xmlns:a="http://schemas.openxmlformats.org/drawingml/2006/main" prst="star5">
@@ -4212,7 +4216,7 @@
           <p:nvPr>
             <p:extLst>
               <p:ext uri="{D42A27DB-BD31-4B8C-83A1-F6EECF244321}">
-                <p14:modId xmlns:p14="http://schemas.microsoft.com/office/powerpoint/2010/main" val="2895773915"/>
+                <p14:modId xmlns:p14="http://schemas.microsoft.com/office/powerpoint/2010/main" val="4253830846"/>
               </p:ext>
             </p:extLst>
           </p:nvPr>

</xml_diff>